<commit_message>
Added some more logos.
</commit_message>
<xml_diff>
--- a/Presentations/NOBUGS 2012/Posters/AutomatedReduction/Automated data processing using Mantid at the SNS.pptx
+++ b/Presentations/NOBUGS 2012/Posters/AutomatedReduction/Automated data processing using Mantid at the SNS.pptx
@@ -3204,7 +3204,7 @@
         </p:nvSpPr>
         <p:spPr bwMode="auto">
           <a:xfrm>
-            <a:off x="15527422" y="18300212"/>
+            <a:off x="15527422" y="18020812"/>
             <a:ext cx="3231975" cy="830997"/>
           </a:xfrm>
           <a:prstGeom prst="rect">
@@ -3494,29 +3494,8 @@
               <a:rPr lang="en-US" sz="3200" dirty="0" smtClean="0">
                 <a:cs typeface="Helvetica"/>
               </a:rPr>
-              <a:t>    Identified POWGEN, a high throughput instrument, as the first instrument to test </a:t>
-            </a:r>
-            <a:r>
-              <a:rPr lang="en-US" sz="3200" dirty="0" smtClean="0">
-                <a:cs typeface="Helvetica"/>
-              </a:rPr>
-              <a:t>the </a:t>
-            </a:r>
-            <a:r>
-              <a:rPr lang="en-US" sz="3200" dirty="0" smtClean="0">
-                <a:cs typeface="Helvetica"/>
-              </a:rPr>
-              <a:t>automated data reduction </a:t>
-            </a:r>
-            <a:r>
-              <a:rPr lang="en-US" sz="3200" dirty="0" smtClean="0">
-                <a:cs typeface="Helvetica"/>
-              </a:rPr>
-              <a:t>framework</a:t>
-            </a:r>
-            <a:endParaRPr lang="en-US" sz="3200" dirty="0" smtClean="0">
-              <a:cs typeface="Helvetica"/>
-            </a:endParaRPr>
+              <a:t>    Identified POWGEN, a high throughput instrument, as the first instrument to test the automated data reduction framework</a:t>
+            </a:r>
           </a:p>
           <a:p>
             <a:pPr marL="0" lvl="1">
@@ -3527,19 +3506,7 @@
               <a:rPr lang="en-US" sz="3200" dirty="0" smtClean="0">
                 <a:cs typeface="Helvetica"/>
               </a:rPr>
-              <a:t>    Met with </a:t>
-            </a:r>
-            <a:r>
-              <a:rPr lang="en-US" sz="3200" dirty="0" smtClean="0">
-                <a:cs typeface="Helvetica"/>
-              </a:rPr>
-              <a:t>instrument </a:t>
-            </a:r>
-            <a:r>
-              <a:rPr lang="en-US" sz="3200" dirty="0" smtClean="0">
-                <a:cs typeface="Helvetica"/>
-              </a:rPr>
-              <a:t>scientist to determine parameters necessary for data reduction.</a:t>
+              <a:t>    Met with instrument scientist to determine parameters necessary for data reduction.</a:t>
             </a:r>
           </a:p>
           <a:p>
@@ -3563,13 +3530,7 @@
               <a:rPr lang="en-US" sz="3200" dirty="0" smtClean="0">
                 <a:cs typeface="Helvetica"/>
               </a:rPr>
-              <a:t> Python </a:t>
-            </a:r>
-            <a:r>
-              <a:rPr lang="en-US" sz="3200" dirty="0" smtClean="0">
-                <a:cs typeface="Helvetica"/>
-              </a:rPr>
-              <a:t>algorithm </a:t>
+              <a:t> Python algorithm </a:t>
             </a:r>
             <a:r>
               <a:rPr lang="en-US" sz="3200" dirty="0" err="1" smtClean="0">
@@ -3582,25 +3543,7 @@
               <a:rPr lang="en-US" sz="3200" dirty="0" smtClean="0">
                 <a:cs typeface="Helvetica"/>
               </a:rPr>
-              <a:t> </a:t>
-            </a:r>
-            <a:r>
-              <a:rPr lang="en-US" sz="3200" dirty="0" smtClean="0">
-                <a:cs typeface="Helvetica"/>
-              </a:rPr>
-              <a:t>with input parameters </a:t>
-            </a:r>
-            <a:r>
-              <a:rPr lang="en-US" sz="3200" dirty="0" smtClean="0">
-                <a:cs typeface="Helvetica"/>
-              </a:rPr>
-              <a:t>confirmed by </a:t>
-            </a:r>
-            <a:r>
-              <a:rPr lang="en-US" sz="3200" dirty="0" smtClean="0">
-                <a:cs typeface="Helvetica"/>
-              </a:rPr>
-              <a:t>the instrument team and data reduction team</a:t>
+              <a:t> with input parameters confirmed by the instrument team and data reduction team</a:t>
             </a:r>
           </a:p>
           <a:p>
@@ -3612,13 +3555,7 @@
               <a:rPr lang="en-US" sz="3200" dirty="0" smtClean="0">
                 <a:cs typeface="Helvetica"/>
               </a:rPr>
-              <a:t>    Enabled instrument teams to modify the auto reduction script with the updated </a:t>
-            </a:r>
-            <a:r>
-              <a:rPr lang="en-US" sz="3200" dirty="0" smtClean="0">
-                <a:cs typeface="Helvetica"/>
-              </a:rPr>
-              <a:t>parameters for the experiment</a:t>
+              <a:t>    Enabled instrument teams to modify the auto reduction script with the updated parameters for the experiment</a:t>
             </a:r>
           </a:p>
           <a:p>
@@ -3642,23 +3579,8 @@
               <a:rPr lang="en-US" sz="3200" dirty="0" smtClean="0">
                 <a:cs typeface="Helvetica"/>
               </a:rPr>
-              <a:t>    </a:t>
-            </a:r>
-            <a:r>
-              <a:rPr lang="en-US" sz="3200" dirty="0" smtClean="0">
-                <a:cs typeface="Helvetica"/>
-              </a:rPr>
-              <a:t>Deployed the post processing suite into production for POWGEN and received positive remarks from users, in particular, the system served mail-in samples </a:t>
-            </a:r>
-            <a:r>
-              <a:rPr lang="en-US" sz="3200" dirty="0" smtClean="0">
-                <a:cs typeface="Helvetica"/>
-              </a:rPr>
-              <a:t>well</a:t>
-            </a:r>
-            <a:endParaRPr lang="en-US" sz="3200" dirty="0" smtClean="0">
-              <a:cs typeface="Helvetica"/>
-            </a:endParaRPr>
+              <a:t>    Deployed the post processing suite into production for POWGEN and received positive remarks from users, in particular, the system served mail-in samples well</a:t>
+            </a:r>
           </a:p>
           <a:p>
             <a:pPr marL="0" lvl="1">
@@ -3669,43 +3591,19 @@
               <a:rPr lang="en-US" sz="3200" dirty="0" smtClean="0">
                 <a:cs typeface="Helvetica"/>
               </a:rPr>
-              <a:t>    Leveraged the </a:t>
+              <a:t>    Leveraged the automated reduction techniques used in POWGEN together with the well defined </a:t>
+            </a:r>
+            <a:r>
+              <a:rPr lang="en-US" sz="3200" dirty="0" err="1" smtClean="0">
+                <a:cs typeface="Helvetica"/>
+              </a:rPr>
+              <a:t>Mantid</a:t>
             </a:r>
             <a:r>
               <a:rPr lang="en-US" sz="3200" dirty="0" smtClean="0">
                 <a:cs typeface="Helvetica"/>
               </a:rPr>
-              <a:t>automated </a:t>
-            </a:r>
-            <a:r>
-              <a:rPr lang="en-US" sz="3200" dirty="0" smtClean="0">
-                <a:cs typeface="Helvetica"/>
-              </a:rPr>
-              <a:t>reduction techniques used in POWGEN together with the well defined </a:t>
-            </a:r>
-            <a:r>
-              <a:rPr lang="en-US" sz="3200" dirty="0" err="1" smtClean="0">
-                <a:cs typeface="Helvetica"/>
-              </a:rPr>
-              <a:t>Mantid</a:t>
-            </a:r>
-            <a:r>
-              <a:rPr lang="en-US" sz="3200" dirty="0" smtClean="0">
-                <a:cs typeface="Helvetica"/>
-              </a:rPr>
-              <a:t> data reduction </a:t>
-            </a:r>
-            <a:r>
-              <a:rPr lang="en-US" sz="3200" dirty="0" smtClean="0">
-                <a:cs typeface="Helvetica"/>
-              </a:rPr>
-              <a:t>algorithms to </a:t>
-            </a:r>
-            <a:r>
-              <a:rPr lang="en-US" sz="3200" dirty="0" smtClean="0">
-                <a:cs typeface="Helvetica"/>
-              </a:rPr>
-              <a:t>additional instruments including </a:t>
+              <a:t> data reduction algorithms to additional instruments including </a:t>
             </a:r>
             <a:r>
               <a:rPr lang="en-US" sz="3200" dirty="0" smtClean="0"/>
@@ -9254,6 +9152,84 @@
           </a:p>
         </p:txBody>
       </p:sp>
+      <p:pic>
+        <p:nvPicPr>
+          <p:cNvPr id="4" name="Picture 3"/>
+          <p:cNvPicPr>
+            <a:picLocks noChangeAspect="1"/>
+          </p:cNvPicPr>
+          <p:nvPr/>
+        </p:nvPicPr>
+        <p:blipFill>
+          <a:blip r:embed="rId4"/>
+          <a:stretch>
+            <a:fillRect/>
+          </a:stretch>
+        </p:blipFill>
+        <p:spPr>
+          <a:xfrm>
+            <a:off x="24180800" y="17727082"/>
+            <a:ext cx="1600200" cy="1792817"/>
+          </a:xfrm>
+          <a:prstGeom prst="rect">
+            <a:avLst/>
+          </a:prstGeom>
+        </p:spPr>
+      </p:pic>
+      <p:pic>
+        <p:nvPicPr>
+          <p:cNvPr id="117" name="Picture 116" descr="ADARA_C.png"/>
+          <p:cNvPicPr>
+            <a:picLocks noChangeAspect="1"/>
+          </p:cNvPicPr>
+          <p:nvPr/>
+        </p:nvPicPr>
+        <p:blipFill>
+          <a:blip r:embed="rId3">
+            <a:extLst>
+              <a:ext uri="{28A0092B-C50C-407E-A947-70E740481C1C}">
+                <a14:useLocalDpi xmlns:a14="http://schemas.microsoft.com/office/drawing/2010/main" val="0"/>
+              </a:ext>
+            </a:extLst>
+          </a:blip>
+          <a:stretch>
+            <a:fillRect/>
+          </a:stretch>
+        </p:blipFill>
+        <p:spPr>
+          <a:xfrm>
+            <a:off x="18966137" y="18043161"/>
+            <a:ext cx="5028394" cy="1005679"/>
+          </a:xfrm>
+          <a:prstGeom prst="rect">
+            <a:avLst/>
+          </a:prstGeom>
+        </p:spPr>
+      </p:pic>
+      <p:pic>
+        <p:nvPicPr>
+          <p:cNvPr id="7" name="Picture 6"/>
+          <p:cNvPicPr>
+            <a:picLocks noChangeAspect="1"/>
+          </p:cNvPicPr>
+          <p:nvPr/>
+        </p:nvPicPr>
+        <p:blipFill>
+          <a:blip r:embed="rId5"/>
+          <a:stretch>
+            <a:fillRect/>
+          </a:stretch>
+        </p:blipFill>
+        <p:spPr>
+          <a:xfrm>
+            <a:off x="26339162" y="17617438"/>
+            <a:ext cx="1714500" cy="1714500"/>
+          </a:xfrm>
+          <a:prstGeom prst="rect">
+            <a:avLst/>
+          </a:prstGeom>
+        </p:spPr>
+      </p:pic>
     </p:spTree>
   </p:cSld>
   <p:clrMapOvr>

</xml_diff>